<commit_message>
almost done with presentation, please look over and
still need to add more pictures
</commit_message>
<xml_diff>
--- a/Presentation.pptx
+++ b/Presentation.pptx
@@ -8,16 +8,16 @@
     <p:sldId id="256" r:id="rId2"/>
     <p:sldId id="257" r:id="rId3"/>
     <p:sldId id="258" r:id="rId4"/>
-    <p:sldId id="259" r:id="rId5"/>
-    <p:sldId id="262" r:id="rId6"/>
-    <p:sldId id="261" r:id="rId7"/>
-    <p:sldId id="260" r:id="rId8"/>
+    <p:sldId id="261" r:id="rId5"/>
+    <p:sldId id="260" r:id="rId6"/>
+    <p:sldId id="259" r:id="rId7"/>
+    <p:sldId id="262" r:id="rId8"/>
     <p:sldId id="263" r:id="rId9"/>
-    <p:sldId id="264" r:id="rId10"/>
-    <p:sldId id="267" r:id="rId11"/>
-    <p:sldId id="265" r:id="rId12"/>
-    <p:sldId id="266" r:id="rId13"/>
-    <p:sldId id="268" r:id="rId14"/>
+    <p:sldId id="267" r:id="rId10"/>
+    <p:sldId id="264" r:id="rId11"/>
+    <p:sldId id="268" r:id="rId12"/>
+    <p:sldId id="265" r:id="rId13"/>
+    <p:sldId id="266" r:id="rId14"/>
     <p:sldId id="269" r:id="rId15"/>
     <p:sldId id="270" r:id="rId16"/>
   </p:sldIdLst>
@@ -318,7 +318,7 @@
           <a:p>
             <a:fld id="{5A66AF80-B104-49B0-AE6F-8E381139FF3B}" type="datetimeFigureOut">
               <a:rPr lang="en-US" smtClean="0"/>
-              <a:t>11/27/2015</a:t>
+              <a:t>11/28/2015</a:t>
             </a:fld>
             <a:endParaRPr lang="en-US"/>
           </a:p>
@@ -488,7 +488,7 @@
           <a:p>
             <a:fld id="{5A66AF80-B104-49B0-AE6F-8E381139FF3B}" type="datetimeFigureOut">
               <a:rPr lang="en-US" smtClean="0"/>
-              <a:t>11/27/2015</a:t>
+              <a:t>11/28/2015</a:t>
             </a:fld>
             <a:endParaRPr lang="en-US"/>
           </a:p>
@@ -668,7 +668,7 @@
           <a:p>
             <a:fld id="{5A66AF80-B104-49B0-AE6F-8E381139FF3B}" type="datetimeFigureOut">
               <a:rPr lang="en-US" smtClean="0"/>
-              <a:t>11/27/2015</a:t>
+              <a:t>11/28/2015</a:t>
             </a:fld>
             <a:endParaRPr lang="en-US"/>
           </a:p>
@@ -838,7 +838,7 @@
           <a:p>
             <a:fld id="{5A66AF80-B104-49B0-AE6F-8E381139FF3B}" type="datetimeFigureOut">
               <a:rPr lang="en-US" smtClean="0"/>
-              <a:t>11/27/2015</a:t>
+              <a:t>11/28/2015</a:t>
             </a:fld>
             <a:endParaRPr lang="en-US"/>
           </a:p>
@@ -1084,7 +1084,7 @@
           <a:p>
             <a:fld id="{5A66AF80-B104-49B0-AE6F-8E381139FF3B}" type="datetimeFigureOut">
               <a:rPr lang="en-US" smtClean="0"/>
-              <a:t>11/27/2015</a:t>
+              <a:t>11/28/2015</a:t>
             </a:fld>
             <a:endParaRPr lang="en-US"/>
           </a:p>
@@ -1372,7 +1372,7 @@
           <a:p>
             <a:fld id="{5A66AF80-B104-49B0-AE6F-8E381139FF3B}" type="datetimeFigureOut">
               <a:rPr lang="en-US" smtClean="0"/>
-              <a:t>11/27/2015</a:t>
+              <a:t>11/28/2015</a:t>
             </a:fld>
             <a:endParaRPr lang="en-US"/>
           </a:p>
@@ -1794,7 +1794,7 @@
           <a:p>
             <a:fld id="{5A66AF80-B104-49B0-AE6F-8E381139FF3B}" type="datetimeFigureOut">
               <a:rPr lang="en-US" smtClean="0"/>
-              <a:t>11/27/2015</a:t>
+              <a:t>11/28/2015</a:t>
             </a:fld>
             <a:endParaRPr lang="en-US"/>
           </a:p>
@@ -1912,7 +1912,7 @@
           <a:p>
             <a:fld id="{5A66AF80-B104-49B0-AE6F-8E381139FF3B}" type="datetimeFigureOut">
               <a:rPr lang="en-US" smtClean="0"/>
-              <a:t>11/27/2015</a:t>
+              <a:t>11/28/2015</a:t>
             </a:fld>
             <a:endParaRPr lang="en-US"/>
           </a:p>
@@ -2007,7 +2007,7 @@
           <a:p>
             <a:fld id="{5A66AF80-B104-49B0-AE6F-8E381139FF3B}" type="datetimeFigureOut">
               <a:rPr lang="en-US" smtClean="0"/>
-              <a:t>11/27/2015</a:t>
+              <a:t>11/28/2015</a:t>
             </a:fld>
             <a:endParaRPr lang="en-US"/>
           </a:p>
@@ -2284,7 +2284,7 @@
           <a:p>
             <a:fld id="{5A66AF80-B104-49B0-AE6F-8E381139FF3B}" type="datetimeFigureOut">
               <a:rPr lang="en-US" smtClean="0"/>
-              <a:t>11/27/2015</a:t>
+              <a:t>11/28/2015</a:t>
             </a:fld>
             <a:endParaRPr lang="en-US"/>
           </a:p>
@@ -2537,7 +2537,7 @@
           <a:p>
             <a:fld id="{5A66AF80-B104-49B0-AE6F-8E381139FF3B}" type="datetimeFigureOut">
               <a:rPr lang="en-US" smtClean="0"/>
-              <a:t>11/27/2015</a:t>
+              <a:t>11/28/2015</a:t>
             </a:fld>
             <a:endParaRPr lang="en-US"/>
           </a:p>
@@ -2750,7 +2750,7 @@
           <a:p>
             <a:fld id="{5A66AF80-B104-49B0-AE6F-8E381139FF3B}" type="datetimeFigureOut">
               <a:rPr lang="en-US" smtClean="0"/>
-              <a:t>11/27/2015</a:t>
+              <a:t>11/28/2015</a:t>
             </a:fld>
             <a:endParaRPr lang="en-US"/>
           </a:p>
@@ -3219,7 +3219,11 @@
           <a:p>
             <a:r>
               <a:rPr lang="en-US" dirty="0" smtClean="0"/>
-              <a:t>Pictures of Algorithm Debugging</a:t>
+              <a:t>Algorithm </a:t>
+            </a:r>
+            <a:r>
+              <a:rPr lang="en-US" dirty="0" smtClean="0"/>
+              <a:t>Speed Enhancements</a:t>
             </a:r>
             <a:endParaRPr lang="en-US" dirty="0"/>
           </a:p>
@@ -3242,15 +3246,109 @@
           </a:xfrm>
         </p:spPr>
         <p:txBody>
-          <a:bodyPr/>
+          <a:bodyPr>
+            <a:normAutofit fontScale="92500" lnSpcReduction="20000"/>
+          </a:bodyPr>
           <a:lstStyle/>
           <a:p>
             <a:pPr algn="l"/>
             <a:r>
-              <a:rPr lang="en-US" dirty="0" smtClean="0"/>
-              <a:t>a</a:t>
-            </a:r>
-            <a:endParaRPr lang="en-US" dirty="0"/>
+              <a:rPr lang="en-US" sz="2000" dirty="0" smtClean="0"/>
+              <a:t>Even with Alpha Beta Pruning, the algorithm is too slow when we want Iterative Deepening to increase the depth more</a:t>
+            </a:r>
+          </a:p>
+          <a:p>
+            <a:pPr algn="l"/>
+            <a:r>
+              <a:rPr lang="en-US" sz="2000" dirty="0" smtClean="0"/>
+              <a:t>Not </a:t>
+            </a:r>
+            <a:r>
+              <a:rPr lang="en-US" sz="2000" dirty="0"/>
+              <a:t>all tiles are good to search</a:t>
+            </a:r>
+          </a:p>
+          <a:p>
+            <a:pPr marL="342900" indent="-342900" algn="l">
+              <a:buFont typeface="Arial" panose="020B0604020202020204" pitchFamily="34" charset="0"/>
+              <a:buChar char="•"/>
+            </a:pPr>
+            <a:r>
+              <a:rPr lang="en-US" sz="2000" dirty="0"/>
+              <a:t>Avoid branching on all of 64 tiles</a:t>
+            </a:r>
+          </a:p>
+          <a:p>
+            <a:pPr marL="342900" indent="-342900" algn="l">
+              <a:buFont typeface="Arial" panose="020B0604020202020204" pitchFamily="34" charset="0"/>
+              <a:buChar char="•"/>
+            </a:pPr>
+            <a:r>
+              <a:rPr lang="en-US" sz="2000" dirty="0"/>
+              <a:t>Ignore illegal moves</a:t>
+            </a:r>
+          </a:p>
+          <a:p>
+            <a:pPr marL="342900" indent="-342900" algn="l">
+              <a:buFont typeface="Arial" panose="020B0604020202020204" pitchFamily="34" charset="0"/>
+              <a:buChar char="•"/>
+            </a:pPr>
+            <a:r>
+              <a:rPr lang="en-US" sz="2000" dirty="0"/>
+              <a:t>Restrict branching to tiles near existing tiles. A distance of 4 away (since 4 moves needed to win)</a:t>
+            </a:r>
+          </a:p>
+          <a:p>
+            <a:pPr algn="l"/>
+            <a:r>
+              <a:rPr lang="en-US" sz="2000" dirty="0" smtClean="0"/>
+              <a:t>Even </a:t>
+            </a:r>
+            <a:r>
+              <a:rPr lang="en-US" sz="2000" dirty="0" smtClean="0"/>
+              <a:t>if some tiles are valid for expansion. Do not bother to expand if the </a:t>
+            </a:r>
+            <a:r>
+              <a:rPr lang="en-US" sz="2000" dirty="0" smtClean="0"/>
+              <a:t>tile’s value </a:t>
+            </a:r>
+            <a:r>
+              <a:rPr lang="en-US" sz="2000" dirty="0" smtClean="0"/>
+              <a:t>is too low.</a:t>
+            </a:r>
+          </a:p>
+          <a:p>
+            <a:pPr marL="342900" indent="-342900" algn="l">
+              <a:buFont typeface="Arial" panose="020B0604020202020204" pitchFamily="34" charset="0"/>
+              <a:buChar char="•"/>
+            </a:pPr>
+            <a:r>
+              <a:rPr lang="en-US" sz="2000" dirty="0" smtClean="0"/>
+              <a:t>Algorithm will look all values of available tiles and determine a threshold value. </a:t>
+            </a:r>
+            <a:endParaRPr lang="en-US" sz="2000" dirty="0" smtClean="0"/>
+          </a:p>
+          <a:p>
+            <a:pPr marL="342900" indent="-342900" algn="l">
+              <a:buFont typeface="Arial" panose="020B0604020202020204" pitchFamily="34" charset="0"/>
+              <a:buChar char="•"/>
+            </a:pPr>
+            <a:r>
+              <a:rPr lang="en-US" sz="2000" dirty="0" smtClean="0"/>
+              <a:t>Tiles </a:t>
+            </a:r>
+            <a:r>
+              <a:rPr lang="en-US" sz="2000" dirty="0" smtClean="0"/>
+              <a:t>with values below the threshold will not be expanded.</a:t>
+            </a:r>
+          </a:p>
+          <a:p>
+            <a:pPr algn="l"/>
+            <a:r>
+              <a:rPr lang="en-US" sz="2000" dirty="0" smtClean="0"/>
+              <a:t>Reduce branching factor and speed up algorithm. This gives it more time to evaluate better branches to a larger depth</a:t>
+            </a:r>
+            <a:endParaRPr lang="en-US" sz="2000" dirty="0"/>
           </a:p>
         </p:txBody>
       </p:sp>
@@ -3306,7 +3404,7 @@
           <a:p>
             <a:r>
               <a:rPr lang="en-US" dirty="0" smtClean="0"/>
-              <a:t>How to compare Other AI/Player</a:t>
+              <a:t>Improving Utility Function</a:t>
             </a:r>
             <a:endParaRPr lang="en-US" dirty="0"/>
           </a:p>
@@ -3329,15 +3427,98 @@
           </a:xfrm>
         </p:spPr>
         <p:txBody>
-          <a:bodyPr/>
-          <a:lstStyle/>
+          <a:bodyPr>
+            <a:normAutofit/>
+          </a:bodyPr>
+          <a:lstStyle/>
+          <a:p>
+            <a:pPr marL="342900" indent="-342900" algn="l">
+              <a:buFont typeface="Arial" panose="020B0604020202020204" pitchFamily="34" charset="0"/>
+              <a:buChar char="•"/>
+            </a:pPr>
+            <a:r>
+              <a:rPr lang="en-US" sz="2000" dirty="0" smtClean="0"/>
+              <a:t>We were able to improve the cost function after running several instances of our initial AI</a:t>
+            </a:r>
+          </a:p>
           <a:p>
             <a:pPr algn="l"/>
             <a:r>
-              <a:rPr lang="en-US" dirty="0" smtClean="0"/>
-              <a:t>a</a:t>
-            </a:r>
-            <a:endParaRPr lang="en-US" dirty="0"/>
+              <a:rPr lang="en-US" sz="2000" dirty="0" smtClean="0"/>
+              <a:t>Tile location of the first move doesn’t matter too much</a:t>
+            </a:r>
+          </a:p>
+          <a:p>
+            <a:pPr marL="800100" lvl="1" indent="-342900" algn="l">
+              <a:buFont typeface="Arial" panose="020B0604020202020204" pitchFamily="34" charset="0"/>
+              <a:buChar char="•"/>
+            </a:pPr>
+            <a:r>
+              <a:rPr lang="en-US" sz="1600" dirty="0" smtClean="0"/>
+              <a:t>We can save time by starting the algorithm with a low depth value</a:t>
+            </a:r>
+          </a:p>
+          <a:p>
+            <a:pPr marL="800100" lvl="1" indent="-342900" algn="l">
+              <a:buFont typeface="Arial" panose="020B0604020202020204" pitchFamily="34" charset="0"/>
+              <a:buChar char="•"/>
+            </a:pPr>
+            <a:r>
+              <a:rPr lang="en-US" sz="1600" dirty="0" smtClean="0"/>
+              <a:t>Depth will increase on successive moves through</a:t>
+            </a:r>
+          </a:p>
+          <a:p>
+            <a:pPr algn="l"/>
+            <a:r>
+              <a:rPr lang="en-US" sz="2000" dirty="0" smtClean="0"/>
+              <a:t>Tile values needed to be improved</a:t>
+            </a:r>
+          </a:p>
+          <a:p>
+            <a:pPr marL="800100" lvl="1" indent="-342900" algn="l">
+              <a:buFont typeface="Arial" panose="020B0604020202020204" pitchFamily="34" charset="0"/>
+              <a:buChar char="•"/>
+            </a:pPr>
+            <a:r>
+              <a:rPr lang="en-US" sz="1600" dirty="0" smtClean="0"/>
+              <a:t>Original algorithm would increase tile values for nearby tiles of same color and decrease tile values for tiles of adversary’s color</a:t>
+            </a:r>
+          </a:p>
+          <a:p>
+            <a:pPr marL="800100" lvl="1" indent="-342900" algn="l">
+              <a:buFont typeface="Arial" panose="020B0604020202020204" pitchFamily="34" charset="0"/>
+              <a:buChar char="•"/>
+            </a:pPr>
+            <a:r>
+              <a:rPr lang="en-US" sz="1600" dirty="0" smtClean="0"/>
+              <a:t>This led to occasional bad moves of the AI where it would place tiles very far from its own tiles and adversary’s tiles</a:t>
+            </a:r>
+          </a:p>
+          <a:p>
+            <a:pPr marL="800100" lvl="1" indent="-342900" algn="l">
+              <a:buFont typeface="Arial" panose="020B0604020202020204" pitchFamily="34" charset="0"/>
+              <a:buChar char="•"/>
+            </a:pPr>
+            <a:r>
+              <a:rPr lang="en-US" sz="1600" dirty="0" smtClean="0"/>
+              <a:t>Algorithm was adjusted to base tile values only it’s own color. Each tile thus had two values, it’s worth to the AI and it’s worth to the adversary</a:t>
+            </a:r>
+          </a:p>
+          <a:p>
+            <a:pPr marL="800100" lvl="1" indent="-342900" algn="l">
+              <a:buFont typeface="Arial" panose="020B0604020202020204" pitchFamily="34" charset="0"/>
+              <a:buChar char="•"/>
+            </a:pPr>
+            <a:r>
+              <a:rPr lang="en-US" sz="1600" dirty="0" smtClean="0"/>
+              <a:t>Had to alpha-beta pruning to take the min and max of the adversary’s tiles values and not it’s own tile’s values whe</a:t>
+            </a:r>
+            <a:r>
+              <a:rPr lang="en-US" sz="1600" dirty="0" smtClean="0"/>
+              <a:t>n pruning. </a:t>
+            </a:r>
+            <a:endParaRPr lang="en-US" sz="1600" dirty="0"/>
           </a:p>
         </p:txBody>
       </p:sp>
@@ -3393,14 +3574,7 @@
           <a:p>
             <a:r>
               <a:rPr lang="en-US" dirty="0" smtClean="0"/>
-              <a:t>Timing/Space/Complexity</a:t>
-            </a:r>
-            <a:br>
-              <a:rPr lang="en-US" dirty="0" smtClean="0"/>
-            </a:br>
-            <a:r>
-              <a:rPr lang="en-US" dirty="0" smtClean="0"/>
-              <a:t>Is it reasonable?</a:t>
+              <a:t>Win Rate</a:t>
             </a:r>
             <a:endParaRPr lang="en-US" dirty="0"/>
           </a:p>
@@ -3423,15 +3597,157 @@
           </a:xfrm>
         </p:spPr>
         <p:txBody>
-          <a:bodyPr/>
+          <a:bodyPr>
+            <a:normAutofit fontScale="85000" lnSpcReduction="20000"/>
+          </a:bodyPr>
           <a:lstStyle/>
           <a:p>
             <a:pPr algn="l"/>
             <a:r>
-              <a:rPr lang="en-US" dirty="0" smtClean="0"/>
-              <a:t>a</a:t>
-            </a:r>
-            <a:endParaRPr lang="en-US" dirty="0"/>
+              <a:rPr lang="en-US" sz="2000" dirty="0" smtClean="0"/>
+              <a:t>Compared to Bad AI</a:t>
+            </a:r>
+          </a:p>
+          <a:p>
+            <a:pPr marL="342900" indent="-342900" algn="l">
+              <a:buFont typeface="Arial" panose="020B0604020202020204" pitchFamily="34" charset="0"/>
+              <a:buChar char="•"/>
+            </a:pPr>
+            <a:r>
+              <a:rPr lang="en-US" sz="2000" dirty="0" smtClean="0"/>
+              <a:t>Algorithm will always win against very bad AI, such as Random AI</a:t>
+            </a:r>
+          </a:p>
+          <a:p>
+            <a:pPr marL="342900" indent="-342900" algn="l">
+              <a:buFont typeface="Arial" panose="020B0604020202020204" pitchFamily="34" charset="0"/>
+              <a:buChar char="•"/>
+            </a:pPr>
+            <a:r>
+              <a:rPr lang="en-US" sz="2000" dirty="0" smtClean="0"/>
+              <a:t>It will also usually win against AI using only dept</a:t>
+            </a:r>
+            <a:r>
+              <a:rPr lang="en-US" sz="2000" dirty="0" smtClean="0"/>
+              <a:t>h of 0</a:t>
+            </a:r>
+          </a:p>
+          <a:p>
+            <a:pPr marL="800100" lvl="1" indent="-342900" algn="l">
+              <a:buFont typeface="Arial" panose="020B0604020202020204" pitchFamily="34" charset="0"/>
+              <a:buChar char="•"/>
+            </a:pPr>
+            <a:r>
+              <a:rPr lang="en-US" sz="1600" dirty="0" smtClean="0"/>
+              <a:t>Depth 0 AI will not expand moves, but just find max of tile values</a:t>
+            </a:r>
+          </a:p>
+          <a:p>
+            <a:pPr marL="800100" lvl="1" indent="-342900" algn="l">
+              <a:buFont typeface="Arial" panose="020B0604020202020204" pitchFamily="34" charset="0"/>
+              <a:buChar char="•"/>
+            </a:pPr>
+            <a:r>
+              <a:rPr lang="en-US" sz="1600" dirty="0" smtClean="0"/>
+              <a:t>Algorithm sometimes lost if the first move was bad. We gave algorithm a low starting depth value and it would occasionally pick a bad first move</a:t>
+            </a:r>
+            <a:endParaRPr lang="en-US" sz="1600" dirty="0" smtClean="0"/>
+          </a:p>
+          <a:p>
+            <a:pPr algn="l"/>
+            <a:r>
+              <a:rPr lang="en-US" sz="2000" dirty="0" smtClean="0"/>
+              <a:t>Compared to Decent AI</a:t>
+            </a:r>
+          </a:p>
+          <a:p>
+            <a:pPr marL="342900" indent="-342900" algn="l">
+              <a:buFont typeface="Arial" panose="020B0604020202020204" pitchFamily="34" charset="0"/>
+              <a:buChar char="•"/>
+            </a:pPr>
+            <a:r>
+              <a:rPr lang="en-US" sz="2000" dirty="0" smtClean="0"/>
+              <a:t>Against our original AI that compared tile values of both itself and the adversary, the algorithm was very good</a:t>
+            </a:r>
+          </a:p>
+          <a:p>
+            <a:pPr marL="800100" lvl="1" indent="-342900" algn="l">
+              <a:buFont typeface="Arial" panose="020B0604020202020204" pitchFamily="34" charset="0"/>
+              <a:buChar char="•"/>
+            </a:pPr>
+            <a:r>
+              <a:rPr lang="en-US" sz="1600" dirty="0" smtClean="0"/>
+              <a:t>This was because the original AI had a higher chance of wasting bad moves</a:t>
+            </a:r>
+          </a:p>
+          <a:p>
+            <a:pPr algn="l"/>
+            <a:r>
+              <a:rPr lang="en-US" sz="2000" dirty="0" smtClean="0"/>
+              <a:t>Compared to Players</a:t>
+            </a:r>
+          </a:p>
+          <a:p>
+            <a:pPr marL="342900" indent="-342900" algn="l">
+              <a:buFont typeface="Arial" panose="020B0604020202020204" pitchFamily="34" charset="0"/>
+              <a:buChar char="•"/>
+            </a:pPr>
+            <a:r>
+              <a:rPr lang="en-US" sz="2000" dirty="0" smtClean="0"/>
+              <a:t>Compared to players, the algorithm would win sometimes</a:t>
+            </a:r>
+          </a:p>
+          <a:p>
+            <a:pPr marL="342900" indent="-342900" algn="l">
+              <a:buFont typeface="Arial" panose="020B0604020202020204" pitchFamily="34" charset="0"/>
+              <a:buChar char="•"/>
+            </a:pPr>
+            <a:r>
+              <a:rPr lang="en-US" sz="2000" dirty="0" smtClean="0"/>
+              <a:t>It was very good at making plans that led to it’s own victory</a:t>
+            </a:r>
+          </a:p>
+          <a:p>
+            <a:pPr marL="800100" lvl="1" indent="-342900" algn="l">
+              <a:buFont typeface="Arial" panose="020B0604020202020204" pitchFamily="34" charset="0"/>
+              <a:buChar char="•"/>
+            </a:pPr>
+            <a:r>
+              <a:rPr lang="en-US" sz="1600" dirty="0" smtClean="0"/>
+              <a:t>Moves that allowed multiple possible winning moves</a:t>
+            </a:r>
+            <a:endParaRPr lang="en-US" sz="1600" dirty="0" smtClean="0"/>
+          </a:p>
+          <a:p>
+            <a:pPr marL="342900" indent="-342900" algn="l">
+              <a:buFont typeface="Arial" panose="020B0604020202020204" pitchFamily="34" charset="0"/>
+              <a:buChar char="•"/>
+            </a:pPr>
+            <a:r>
+              <a:rPr lang="en-US" sz="2000" dirty="0" smtClean="0"/>
+              <a:t>However it was bad at stopping Player’s strategy of making good plans</a:t>
+            </a:r>
+          </a:p>
+          <a:p>
+            <a:pPr marL="800100" lvl="1" indent="-342900" algn="l">
+              <a:buFont typeface="Arial" panose="020B0604020202020204" pitchFamily="34" charset="0"/>
+              <a:buChar char="•"/>
+            </a:pPr>
+            <a:r>
+              <a:rPr lang="en-US" sz="1600" dirty="0" smtClean="0"/>
+              <a:t>It can be easy to beat if the player went first</a:t>
+            </a:r>
+          </a:p>
+          <a:p>
+            <a:pPr marL="800100" lvl="1" indent="-342900" algn="l">
+              <a:buFont typeface="Arial" panose="020B0604020202020204" pitchFamily="34" charset="0"/>
+              <a:buChar char="•"/>
+            </a:pPr>
+            <a:r>
+              <a:rPr lang="en-US" sz="1600" dirty="0" smtClean="0"/>
+              <a:t>AI did not make good blocking moves that could stop players early on</a:t>
+            </a:r>
+            <a:endParaRPr lang="en-US" sz="1600" dirty="0"/>
           </a:p>
         </p:txBody>
       </p:sp>
@@ -3487,8 +3803,15 @@
           <a:p>
             <a:r>
               <a:rPr lang="en-US" dirty="0" smtClean="0"/>
-              <a:t>How good is it? Can it be better?</a:t>
-            </a:r>
+              <a:t>Timing and Space Complexity</a:t>
+            </a:r>
+            <a:r>
+              <a:rPr lang="en-US" dirty="0" smtClean="0"/>
+              <a:t/>
+            </a:r>
+            <a:br>
+              <a:rPr lang="en-US" dirty="0" smtClean="0"/>
+            </a:br>
             <a:endParaRPr lang="en-US" dirty="0"/>
           </a:p>
         </p:txBody>
@@ -3510,15 +3833,96 @@
           </a:xfrm>
         </p:spPr>
         <p:txBody>
-          <a:bodyPr/>
+          <a:bodyPr>
+            <a:normAutofit/>
+          </a:bodyPr>
           <a:lstStyle/>
           <a:p>
             <a:pPr algn="l"/>
             <a:r>
-              <a:rPr lang="en-US" dirty="0" smtClean="0"/>
-              <a:t>a</a:t>
-            </a:r>
-            <a:endParaRPr lang="en-US" dirty="0"/>
+              <a:rPr lang="en-US" sz="2000" dirty="0" smtClean="0">
+                <a:solidFill>
+                  <a:srgbClr val="FF0000"/>
+                </a:solidFill>
+              </a:rPr>
+              <a:t>TODO improve this!</a:t>
+            </a:r>
+          </a:p>
+          <a:p>
+            <a:pPr algn="l"/>
+            <a:r>
+              <a:rPr lang="en-US" sz="2000" dirty="0" smtClean="0"/>
+              <a:t>Timing</a:t>
+            </a:r>
+          </a:p>
+          <a:p>
+            <a:pPr marL="342900" indent="-342900" algn="l">
+              <a:buFont typeface="Arial" panose="020B0604020202020204" pitchFamily="34" charset="0"/>
+              <a:buChar char="•"/>
+            </a:pPr>
+            <a:r>
+              <a:rPr lang="en-US" sz="2000" dirty="0" smtClean="0"/>
+              <a:t>Very fast if depth does not increase too much</a:t>
+            </a:r>
+          </a:p>
+          <a:p>
+            <a:pPr marL="342900" indent="-342900" algn="l">
+              <a:buFont typeface="Arial" panose="020B0604020202020204" pitchFamily="34" charset="0"/>
+              <a:buChar char="•"/>
+            </a:pPr>
+            <a:r>
+              <a:rPr lang="en-US" sz="2000" dirty="0" smtClean="0"/>
+              <a:t>Speeds up of reducing branch size allowed more depth within reasonable time</a:t>
+            </a:r>
+          </a:p>
+          <a:p>
+            <a:pPr marL="342900" indent="-342900" algn="l">
+              <a:buFont typeface="Arial" panose="020B0604020202020204" pitchFamily="34" charset="0"/>
+              <a:buChar char="•"/>
+            </a:pPr>
+            <a:r>
+              <a:rPr lang="en-US" sz="2000" dirty="0" smtClean="0"/>
+              <a:t>Removing speed ups would have made a high depth infeasible</a:t>
+            </a:r>
+          </a:p>
+          <a:p>
+            <a:pPr marL="800100" lvl="1" indent="-342900" algn="l">
+              <a:buFont typeface="Arial" panose="020B0604020202020204" pitchFamily="34" charset="0"/>
+              <a:buChar char="•"/>
+            </a:pPr>
+            <a:r>
+              <a:rPr lang="en-US" sz="1200" dirty="0" smtClean="0"/>
+              <a:t>64 possible tiles was a huge branching factor</a:t>
+            </a:r>
+            <a:endParaRPr lang="en-US" sz="1200" dirty="0"/>
+          </a:p>
+          <a:p>
+            <a:pPr algn="l"/>
+            <a:r>
+              <a:rPr lang="en-US" sz="2000" dirty="0" smtClean="0"/>
+              <a:t>Space</a:t>
+            </a:r>
+          </a:p>
+          <a:p>
+            <a:pPr marL="342900" indent="-342900" algn="l">
+              <a:buFont typeface="Arial" panose="020B0604020202020204" pitchFamily="34" charset="0"/>
+              <a:buChar char="•"/>
+            </a:pPr>
+            <a:r>
+              <a:rPr lang="en-US" sz="2000" dirty="0" smtClean="0"/>
+              <a:t>Storing the data was compact</a:t>
+            </a:r>
+          </a:p>
+          <a:p>
+            <a:pPr marL="342900" indent="-342900" algn="l">
+              <a:buFont typeface="Arial" panose="020B0604020202020204" pitchFamily="34" charset="0"/>
+              <a:buChar char="•"/>
+            </a:pPr>
+            <a:r>
+              <a:rPr lang="en-US" sz="2000" dirty="0" smtClean="0"/>
+              <a:t>Did not search into infinity and create memory issues</a:t>
+            </a:r>
+            <a:endParaRPr lang="en-US" sz="2000" dirty="0"/>
           </a:p>
         </p:txBody>
       </p:sp>
@@ -3691,15 +4095,114 @@
           </a:xfrm>
         </p:spPr>
         <p:txBody>
-          <a:bodyPr/>
+          <a:bodyPr>
+            <a:normAutofit/>
+          </a:bodyPr>
           <a:lstStyle/>
           <a:p>
             <a:pPr algn="l"/>
             <a:r>
-              <a:rPr lang="en-US" dirty="0" smtClean="0"/>
-              <a:t>a</a:t>
-            </a:r>
-            <a:endParaRPr lang="en-US" dirty="0"/>
+              <a:rPr lang="en-US" sz="2000" dirty="0" smtClean="0"/>
+              <a:t>Going first has a huge advantage</a:t>
+            </a:r>
+          </a:p>
+          <a:p>
+            <a:pPr algn="l"/>
+            <a:r>
+              <a:rPr lang="en-US" sz="2000" dirty="0" smtClean="0"/>
+              <a:t>Early in the game, large depth has little deciding factor</a:t>
+            </a:r>
+          </a:p>
+          <a:p>
+            <a:pPr marL="342900" indent="-342900" algn="l">
+              <a:buFont typeface="Arial" panose="020B0604020202020204" pitchFamily="34" charset="0"/>
+              <a:buChar char="•"/>
+            </a:pPr>
+            <a:r>
+              <a:rPr lang="en-US" sz="2000" dirty="0" smtClean="0"/>
+              <a:t>Tiles mostly have relatively same values</a:t>
+            </a:r>
+          </a:p>
+          <a:p>
+            <a:pPr algn="l"/>
+            <a:r>
+              <a:rPr lang="en-US" sz="2000" dirty="0" smtClean="0"/>
+              <a:t>Large depth matters more later in the game</a:t>
+            </a:r>
+          </a:p>
+          <a:p>
+            <a:pPr marL="342900" indent="-342900" algn="l">
+              <a:buFont typeface="Arial" panose="020B0604020202020204" pitchFamily="34" charset="0"/>
+              <a:buChar char="•"/>
+            </a:pPr>
+            <a:r>
+              <a:rPr lang="en-US" sz="2000" dirty="0" smtClean="0"/>
+              <a:t>Tile v</a:t>
+            </a:r>
+            <a:r>
+              <a:rPr lang="en-US" sz="2000" dirty="0" smtClean="0"/>
+              <a:t>alues will differ more as the game progresses</a:t>
+            </a:r>
+          </a:p>
+          <a:p>
+            <a:pPr marL="342900" indent="-342900" algn="l">
+              <a:buFont typeface="Arial" panose="020B0604020202020204" pitchFamily="34" charset="0"/>
+              <a:buChar char="•"/>
+            </a:pPr>
+            <a:r>
+              <a:rPr lang="en-US" sz="2000" dirty="0" smtClean="0"/>
+              <a:t>The best moves are not as obvious</a:t>
+            </a:r>
+          </a:p>
+          <a:p>
+            <a:pPr algn="l"/>
+            <a:r>
+              <a:rPr lang="en-US" sz="2000" dirty="0" smtClean="0"/>
+              <a:t>Alpha beta pruning and branch reduction are necessary</a:t>
+            </a:r>
+          </a:p>
+          <a:p>
+            <a:pPr marL="342900" indent="-342900" algn="l">
+              <a:buFont typeface="Arial" panose="020B0604020202020204" pitchFamily="34" charset="0"/>
+              <a:buChar char="•"/>
+            </a:pPr>
+            <a:r>
+              <a:rPr lang="en-US" sz="2000" dirty="0" smtClean="0"/>
+              <a:t>Branching factor of game is huge</a:t>
+            </a:r>
+          </a:p>
+          <a:p>
+            <a:pPr marL="342900" indent="-342900" algn="l">
+              <a:buFont typeface="Arial" panose="020B0604020202020204" pitchFamily="34" charset="0"/>
+              <a:buChar char="•"/>
+            </a:pPr>
+            <a:r>
+              <a:rPr lang="en-US" sz="2000" dirty="0" smtClean="0"/>
+              <a:t>AI’s moves will take too long when depth increases</a:t>
+            </a:r>
+          </a:p>
+          <a:p>
+            <a:pPr marL="342900" indent="-342900" algn="l">
+              <a:buFont typeface="Arial" panose="020B0604020202020204" pitchFamily="34" charset="0"/>
+              <a:buChar char="•"/>
+            </a:pPr>
+            <a:r>
+              <a:rPr lang="en-US" sz="2000" dirty="0" smtClean="0"/>
+              <a:t>O(</a:t>
+            </a:r>
+            <a:r>
+              <a:rPr lang="en-US" sz="2000" dirty="0" err="1" smtClean="0"/>
+              <a:t>b</a:t>
+            </a:r>
+            <a:r>
+              <a:rPr lang="en-US" sz="2000" baseline="30000" dirty="0" err="1" smtClean="0"/>
+              <a:t>d</a:t>
+            </a:r>
+            <a:r>
+              <a:rPr lang="en-US" sz="2000" dirty="0" smtClean="0"/>
+              <a:t>)</a:t>
+            </a:r>
+            <a:endParaRPr lang="en-US" sz="2000" dirty="0"/>
           </a:p>
         </p:txBody>
       </p:sp>
@@ -3929,7 +4432,7 @@
           <a:p>
             <a:r>
               <a:rPr lang="en-US" dirty="0" smtClean="0"/>
-              <a:t>Describe Problem/Constraints</a:t>
+              <a:t>PEAS</a:t>
             </a:r>
             <a:endParaRPr lang="en-US" dirty="0"/>
           </a:p>
@@ -3953,80 +4456,87 @@
         </p:spPr>
         <p:txBody>
           <a:bodyPr>
-            <a:normAutofit/>
+            <a:noAutofit/>
           </a:bodyPr>
           <a:lstStyle/>
           <a:p>
             <a:pPr algn="l"/>
             <a:r>
-              <a:rPr lang="en-US" sz="2400" dirty="0" smtClean="0"/>
-              <a:t>Strategic game</a:t>
-            </a:r>
-          </a:p>
-          <a:p>
-            <a:pPr marL="342900" indent="-342900" algn="l">
+              <a:rPr lang="en-US" sz="2000" dirty="0" smtClean="0"/>
+              <a:t>Performance</a:t>
+            </a:r>
+          </a:p>
+          <a:p>
+            <a:pPr marL="457200" indent="-457200" algn="l">
               <a:buFont typeface="Arial" panose="020B0604020202020204" pitchFamily="34" charset="0"/>
               <a:buChar char="•"/>
             </a:pPr>
             <a:r>
-              <a:rPr lang="en-US" sz="2400" dirty="0" smtClean="0"/>
-              <a:t>Adversary in Game</a:t>
-            </a:r>
-          </a:p>
-          <a:p>
-            <a:pPr marL="342900" indent="-342900" algn="l">
+              <a:rPr lang="en-US" sz="2000" dirty="0" smtClean="0"/>
+              <a:t>Win the game</a:t>
+            </a:r>
+          </a:p>
+          <a:p>
+            <a:pPr marL="457200" indent="-457200" algn="l">
               <a:buFont typeface="Arial" panose="020B0604020202020204" pitchFamily="34" charset="0"/>
               <a:buChar char="•"/>
             </a:pPr>
             <a:r>
-              <a:rPr lang="en-US" sz="2400" dirty="0" smtClean="0"/>
-              <a:t>Ideal moves may be blocked</a:t>
+              <a:rPr lang="en-US" sz="2000" dirty="0" smtClean="0"/>
+              <a:t>Too slow, infeasible time</a:t>
             </a:r>
           </a:p>
           <a:p>
             <a:pPr algn="l"/>
             <a:r>
-              <a:rPr lang="en-US" sz="2400" dirty="0" smtClean="0"/>
-              <a:t>Very large branching factor of moves</a:t>
-            </a:r>
-          </a:p>
-          <a:p>
-            <a:pPr marL="342900" indent="-342900" algn="l">
+              <a:rPr lang="en-US" sz="2000" dirty="0" smtClean="0"/>
+              <a:t>Environment</a:t>
+            </a:r>
+          </a:p>
+          <a:p>
+            <a:pPr marL="457200" indent="-457200" algn="l">
               <a:buFont typeface="Arial" panose="020B0604020202020204" pitchFamily="34" charset="0"/>
               <a:buChar char="•"/>
             </a:pPr>
             <a:r>
-              <a:rPr lang="en-US" sz="2400" dirty="0" smtClean="0"/>
-              <a:t>Board size of 64</a:t>
-            </a:r>
-          </a:p>
-          <a:p>
-            <a:pPr marL="342900" indent="-342900" algn="l">
+              <a:rPr lang="en-US" sz="2000" dirty="0" smtClean="0"/>
+              <a:t>Game board 8x8 grid</a:t>
+            </a:r>
+          </a:p>
+          <a:p>
+            <a:pPr algn="l"/>
+            <a:r>
+              <a:rPr lang="en-US" sz="2000" dirty="0" smtClean="0"/>
+              <a:t>Actuator</a:t>
+            </a:r>
+          </a:p>
+          <a:p>
+            <a:pPr marL="457200" indent="-457200" algn="l">
               <a:buFont typeface="Arial" panose="020B0604020202020204" pitchFamily="34" charset="0"/>
               <a:buChar char="•"/>
             </a:pPr>
             <a:r>
-              <a:rPr lang="en-US" sz="2400" dirty="0" smtClean="0"/>
-              <a:t>Not all moves will contribute anything</a:t>
+              <a:rPr lang="en-US" sz="2000" dirty="0" smtClean="0"/>
+              <a:t>Placing tiles on the board</a:t>
             </a:r>
           </a:p>
           <a:p>
             <a:pPr algn="l"/>
             <a:r>
-              <a:rPr lang="en-US" sz="2400" dirty="0" smtClean="0"/>
-              <a:t>Good moves are deep, need to plan ahead</a:t>
-            </a:r>
-          </a:p>
-          <a:p>
-            <a:pPr marL="342900" indent="-342900" algn="l">
+              <a:rPr lang="en-US" sz="2000" dirty="0" smtClean="0"/>
+              <a:t>Sensor</a:t>
+            </a:r>
+          </a:p>
+          <a:p>
+            <a:pPr marL="457200" indent="-457200" algn="l">
               <a:buFont typeface="Arial" panose="020B0604020202020204" pitchFamily="34" charset="0"/>
               <a:buChar char="•"/>
             </a:pPr>
             <a:r>
-              <a:rPr lang="en-US" sz="2400" dirty="0" smtClean="0"/>
-              <a:t>Because of nature of the game, obvious winning moves are easy to block. AI needs to plan ahead</a:t>
-            </a:r>
-            <a:endParaRPr lang="en-US" sz="2400" dirty="0"/>
+              <a:rPr lang="en-US" sz="2000" dirty="0" smtClean="0"/>
+              <a:t>Board stored as matrix for evaluation</a:t>
+            </a:r>
+            <a:endParaRPr lang="en-US" sz="2000" dirty="0"/>
           </a:p>
         </p:txBody>
       </p:sp>
@@ -4082,7 +4592,7 @@
           <a:p>
             <a:r>
               <a:rPr lang="en-US" dirty="0" smtClean="0"/>
-              <a:t>What’s a Good H?</a:t>
+              <a:t>Game GUI</a:t>
             </a:r>
             <a:endParaRPr lang="en-US" dirty="0"/>
           </a:p>
@@ -4105,6 +4615,93 @@
           </a:xfrm>
         </p:spPr>
         <p:txBody>
+          <a:bodyPr/>
+          <a:lstStyle/>
+          <a:p>
+            <a:pPr algn="l"/>
+            <a:r>
+              <a:rPr lang="en-US" dirty="0" smtClean="0"/>
+              <a:t>a</a:t>
+            </a:r>
+            <a:endParaRPr lang="en-US" dirty="0"/>
+          </a:p>
+        </p:txBody>
+      </p:sp>
+    </p:spTree>
+    <p:extLst>
+      <p:ext uri="{BB962C8B-B14F-4D97-AF65-F5344CB8AC3E}">
+        <p14:creationId xmlns:p14="http://schemas.microsoft.com/office/powerpoint/2010/main" val="3352461406"/>
+      </p:ext>
+    </p:extLst>
+  </p:cSld>
+  <p:clrMapOvr>
+    <a:masterClrMapping/>
+  </p:clrMapOvr>
+</p:sld>
+</file>
+
+<file path=ppt/slides/slide6.xml><?xml version="1.0" encoding="utf-8"?>
+<p:sld xmlns:a="http://schemas.openxmlformats.org/drawingml/2006/main" xmlns:r="http://schemas.openxmlformats.org/officeDocument/2006/relationships" xmlns:p="http://schemas.openxmlformats.org/presentationml/2006/main">
+  <p:cSld>
+    <p:spTree>
+      <p:nvGrpSpPr>
+        <p:cNvPr id="1" name=""/>
+        <p:cNvGrpSpPr/>
+        <p:nvPr/>
+      </p:nvGrpSpPr>
+      <p:grpSpPr>
+        <a:xfrm>
+          <a:off x="0" y="0"/>
+          <a:ext cx="0" cy="0"/>
+          <a:chOff x="0" y="0"/>
+          <a:chExt cx="0" cy="0"/>
+        </a:xfrm>
+      </p:grpSpPr>
+      <p:sp>
+        <p:nvSpPr>
+          <p:cNvPr id="2" name="Title 1"/>
+          <p:cNvSpPr>
+            <a:spLocks noGrp="1"/>
+          </p:cNvSpPr>
+          <p:nvPr>
+            <p:ph type="ctrTitle"/>
+          </p:nvPr>
+        </p:nvSpPr>
+        <p:spPr>
+          <a:xfrm>
+            <a:off x="685800" y="381000"/>
+            <a:ext cx="7772400" cy="1470025"/>
+          </a:xfrm>
+        </p:spPr>
+        <p:txBody>
+          <a:bodyPr/>
+          <a:lstStyle/>
+          <a:p>
+            <a:r>
+              <a:rPr lang="en-US" dirty="0" smtClean="0"/>
+              <a:t>Describe Problem/Constraints</a:t>
+            </a:r>
+            <a:endParaRPr lang="en-US" dirty="0"/>
+          </a:p>
+        </p:txBody>
+      </p:sp>
+      <p:sp>
+        <p:nvSpPr>
+          <p:cNvPr id="3" name="Subtitle 2"/>
+          <p:cNvSpPr>
+            <a:spLocks noGrp="1"/>
+          </p:cNvSpPr>
+          <p:nvPr>
+            <p:ph type="subTitle" idx="1"/>
+          </p:nvPr>
+        </p:nvSpPr>
+        <p:spPr>
+          <a:xfrm>
+            <a:off x="762000" y="1447800"/>
+            <a:ext cx="7543800" cy="4191000"/>
+          </a:xfrm>
+        </p:spPr>
+        <p:txBody>
           <a:bodyPr>
             <a:normAutofit/>
           </a:bodyPr>
@@ -4112,8 +4709,8 @@
           <a:p>
             <a:pPr algn="l"/>
             <a:r>
-              <a:rPr lang="en-US" sz="2000" dirty="0" smtClean="0"/>
-              <a:t>Utility function</a:t>
+              <a:rPr lang="en-US" sz="2400" dirty="0" smtClean="0"/>
+              <a:t>Strategic game</a:t>
             </a:r>
           </a:p>
           <a:p>
@@ -4122,8 +4719,8 @@
               <a:buChar char="•"/>
             </a:pPr>
             <a:r>
-              <a:rPr lang="en-US" sz="2000" dirty="0" smtClean="0"/>
-              <a:t>Tiles next to existing moves are more ideal</a:t>
+              <a:rPr lang="en-US" sz="2400" dirty="0" smtClean="0"/>
+              <a:t>Adversary in Game</a:t>
             </a:r>
           </a:p>
           <a:p>
@@ -4132,6 +4729,159 @@
               <a:buChar char="•"/>
             </a:pPr>
             <a:r>
+              <a:rPr lang="en-US" sz="2400" dirty="0" smtClean="0"/>
+              <a:t>Ideal moves may be blocked</a:t>
+            </a:r>
+          </a:p>
+          <a:p>
+            <a:pPr algn="l"/>
+            <a:r>
+              <a:rPr lang="en-US" sz="2400" dirty="0" smtClean="0"/>
+              <a:t>Very large branching factor of moves</a:t>
+            </a:r>
+          </a:p>
+          <a:p>
+            <a:pPr marL="342900" indent="-342900" algn="l">
+              <a:buFont typeface="Arial" panose="020B0604020202020204" pitchFamily="34" charset="0"/>
+              <a:buChar char="•"/>
+            </a:pPr>
+            <a:r>
+              <a:rPr lang="en-US" sz="2400" dirty="0" smtClean="0"/>
+              <a:t>Board size of 64</a:t>
+            </a:r>
+          </a:p>
+          <a:p>
+            <a:pPr marL="342900" indent="-342900" algn="l">
+              <a:buFont typeface="Arial" panose="020B0604020202020204" pitchFamily="34" charset="0"/>
+              <a:buChar char="•"/>
+            </a:pPr>
+            <a:r>
+              <a:rPr lang="en-US" sz="2400" dirty="0" smtClean="0"/>
+              <a:t>Not all moves will contribute anything</a:t>
+            </a:r>
+          </a:p>
+          <a:p>
+            <a:pPr algn="l"/>
+            <a:r>
+              <a:rPr lang="en-US" sz="2400" dirty="0" smtClean="0"/>
+              <a:t>Good moves are deep, need to plan ahead</a:t>
+            </a:r>
+          </a:p>
+          <a:p>
+            <a:pPr marL="342900" indent="-342900" algn="l">
+              <a:buFont typeface="Arial" panose="020B0604020202020204" pitchFamily="34" charset="0"/>
+              <a:buChar char="•"/>
+            </a:pPr>
+            <a:r>
+              <a:rPr lang="en-US" sz="2400" dirty="0" smtClean="0"/>
+              <a:t>Because of nature of the game, obvious winning moves are easy to block. AI needs to plan ahead</a:t>
+            </a:r>
+            <a:endParaRPr lang="en-US" sz="2400" dirty="0"/>
+          </a:p>
+        </p:txBody>
+      </p:sp>
+    </p:spTree>
+    <p:extLst>
+      <p:ext uri="{BB962C8B-B14F-4D97-AF65-F5344CB8AC3E}">
+        <p14:creationId xmlns:p14="http://schemas.microsoft.com/office/powerpoint/2010/main" val="3352461406"/>
+      </p:ext>
+    </p:extLst>
+  </p:cSld>
+  <p:clrMapOvr>
+    <a:masterClrMapping/>
+  </p:clrMapOvr>
+</p:sld>
+</file>
+
+<file path=ppt/slides/slide7.xml><?xml version="1.0" encoding="utf-8"?>
+<p:sld xmlns:a="http://schemas.openxmlformats.org/drawingml/2006/main" xmlns:r="http://schemas.openxmlformats.org/officeDocument/2006/relationships" xmlns:p="http://schemas.openxmlformats.org/presentationml/2006/main">
+  <p:cSld>
+    <p:spTree>
+      <p:nvGrpSpPr>
+        <p:cNvPr id="1" name=""/>
+        <p:cNvGrpSpPr/>
+        <p:nvPr/>
+      </p:nvGrpSpPr>
+      <p:grpSpPr>
+        <a:xfrm>
+          <a:off x="0" y="0"/>
+          <a:ext cx="0" cy="0"/>
+          <a:chOff x="0" y="0"/>
+          <a:chExt cx="0" cy="0"/>
+        </a:xfrm>
+      </p:grpSpPr>
+      <p:sp>
+        <p:nvSpPr>
+          <p:cNvPr id="2" name="Title 1"/>
+          <p:cNvSpPr>
+            <a:spLocks noGrp="1"/>
+          </p:cNvSpPr>
+          <p:nvPr>
+            <p:ph type="ctrTitle"/>
+          </p:nvPr>
+        </p:nvSpPr>
+        <p:spPr>
+          <a:xfrm>
+            <a:off x="685800" y="381000"/>
+            <a:ext cx="7772400" cy="1470025"/>
+          </a:xfrm>
+        </p:spPr>
+        <p:txBody>
+          <a:bodyPr/>
+          <a:lstStyle/>
+          <a:p>
+            <a:r>
+              <a:rPr lang="en-US" dirty="0" smtClean="0"/>
+              <a:t>Utility Function</a:t>
+            </a:r>
+            <a:endParaRPr lang="en-US" dirty="0"/>
+          </a:p>
+        </p:txBody>
+      </p:sp>
+      <p:sp>
+        <p:nvSpPr>
+          <p:cNvPr id="3" name="Subtitle 2"/>
+          <p:cNvSpPr>
+            <a:spLocks noGrp="1"/>
+          </p:cNvSpPr>
+          <p:nvPr>
+            <p:ph type="subTitle" idx="1"/>
+          </p:nvPr>
+        </p:nvSpPr>
+        <p:spPr>
+          <a:xfrm>
+            <a:off x="762000" y="1447800"/>
+            <a:ext cx="7543800" cy="4191000"/>
+          </a:xfrm>
+        </p:spPr>
+        <p:txBody>
+          <a:bodyPr>
+            <a:normAutofit/>
+          </a:bodyPr>
+          <a:lstStyle/>
+          <a:p>
+            <a:pPr algn="l"/>
+            <a:r>
+              <a:rPr lang="en-US" sz="2000" dirty="0" smtClean="0"/>
+              <a:t>Utility function</a:t>
+            </a:r>
+          </a:p>
+          <a:p>
+            <a:pPr marL="342900" indent="-342900" algn="l">
+              <a:buFont typeface="Arial" panose="020B0604020202020204" pitchFamily="34" charset="0"/>
+              <a:buChar char="•"/>
+            </a:pPr>
+            <a:r>
+              <a:rPr lang="en-US" sz="2000" dirty="0" smtClean="0"/>
+              <a:t>Tiles next to existing moves are more ideal</a:t>
+            </a:r>
+          </a:p>
+          <a:p>
+            <a:pPr marL="342900" indent="-342900" algn="l">
+              <a:buFont typeface="Arial" panose="020B0604020202020204" pitchFamily="34" charset="0"/>
+              <a:buChar char="•"/>
+            </a:pPr>
+            <a:r>
               <a:rPr lang="en-US" sz="2000" dirty="0" smtClean="0"/>
               <a:t>A tile’s value increases the more tiles are in the vicinity</a:t>
             </a:r>
@@ -4143,7 +4893,11 @@
             </a:pPr>
             <a:r>
               <a:rPr lang="en-US" sz="1600" dirty="0" smtClean="0"/>
-              <a:t>Need to chain tiles together to win</a:t>
+              <a:t>Need </a:t>
+            </a:r>
+            <a:r>
+              <a:rPr lang="en-US" sz="1600" dirty="0" smtClean="0"/>
+              <a:t>to chain tiles together to win</a:t>
             </a:r>
           </a:p>
           <a:p>
@@ -4181,17 +4935,8 @@
             </a:pPr>
             <a:r>
               <a:rPr lang="en-US" sz="2000" dirty="0" smtClean="0"/>
-              <a:t>Straight </a:t>
-            </a:r>
-            <a:r>
-              <a:rPr lang="en-US" sz="2000" dirty="0" smtClean="0"/>
-              <a:t>utility function </a:t>
-            </a:r>
-            <a:r>
-              <a:rPr lang="en-US" sz="2000" dirty="0" smtClean="0"/>
-              <a:t>not completely ideal. Winning moves need to have a higher value so that these moves are committed to first.</a:t>
-            </a:r>
-            <a:endParaRPr lang="en-US" sz="2000" dirty="0" smtClean="0"/>
+              <a:t>Straight utility function not completely ideal. Winning moves need to have a higher value so that these moves are committed to first.</a:t>
+            </a:r>
           </a:p>
         </p:txBody>
       </p:sp>
@@ -4238,12 +4983,12 @@
                     <a:p>
                       <a:pPr algn="l" fontAlgn="b"/>
                       <a:r>
-                        <a:rPr lang="en-US" sz="1100" u="none" strike="noStrike">
+                        <a:rPr lang="en-US" sz="1100" u="none" strike="noStrike" dirty="0">
                           <a:effectLst/>
                         </a:rPr>
                         <a:t> </a:t>
                       </a:r>
-                      <a:endParaRPr lang="en-US" sz="1100" b="0" i="0" u="none" strike="noStrike">
+                      <a:endParaRPr lang="en-US" sz="1100" b="0" i="0" u="none" strike="noStrike" dirty="0">
                         <a:solidFill>
                           <a:srgbClr val="000000"/>
                         </a:solidFill>
@@ -4307,12 +5052,12 @@
                     <a:p>
                       <a:pPr algn="l" fontAlgn="b"/>
                       <a:r>
-                        <a:rPr lang="en-US" sz="1100" u="none" strike="noStrike">
+                        <a:rPr lang="en-US" sz="1100" u="none" strike="noStrike" dirty="0">
                           <a:effectLst/>
                         </a:rPr>
                         <a:t> </a:t>
                       </a:r>
-                      <a:endParaRPr lang="en-US" sz="1100" b="0" i="0" u="none" strike="noStrike">
+                      <a:endParaRPr lang="en-US" sz="1100" b="0" i="0" u="none" strike="noStrike" dirty="0">
                         <a:solidFill>
                           <a:srgbClr val="000000"/>
                         </a:solidFill>
@@ -5083,12 +5828,12 @@
                     <a:p>
                       <a:pPr algn="l" fontAlgn="b"/>
                       <a:r>
-                        <a:rPr lang="en-US" sz="1100" u="none" strike="noStrike">
+                        <a:rPr lang="en-US" sz="1100" u="none" strike="noStrike" dirty="0">
                           <a:effectLst/>
                         </a:rPr>
                         <a:t> </a:t>
                       </a:r>
-                      <a:endParaRPr lang="en-US" sz="1100" b="0" i="0" u="none" strike="noStrike">
+                      <a:endParaRPr lang="en-US" sz="1100" b="0" i="0" u="none" strike="noStrike" dirty="0">
                         <a:solidFill>
                           <a:srgbClr val="000000"/>
                         </a:solidFill>
@@ -5129,12 +5874,12 @@
                     <a:p>
                       <a:pPr algn="l" fontAlgn="b"/>
                       <a:r>
-                        <a:rPr lang="en-US" sz="1100" u="none" strike="noStrike">
+                        <a:rPr lang="en-US" sz="1100" u="none" strike="noStrike" dirty="0">
                           <a:effectLst/>
                         </a:rPr>
                         <a:t> </a:t>
                       </a:r>
-                      <a:endParaRPr lang="en-US" sz="1100" b="0" i="0" u="none" strike="noStrike">
+                      <a:endParaRPr lang="en-US" sz="1100" b="0" i="0" u="none" strike="noStrike" dirty="0">
                         <a:solidFill>
                           <a:srgbClr val="000000"/>
                         </a:solidFill>
@@ -5904,254 +6649,6 @@
 </p:sld>
 </file>
 
-<file path=ppt/slides/slide6.xml><?xml version="1.0" encoding="utf-8"?>
-<p:sld xmlns:a="http://schemas.openxmlformats.org/drawingml/2006/main" xmlns:r="http://schemas.openxmlformats.org/officeDocument/2006/relationships" xmlns:p="http://schemas.openxmlformats.org/presentationml/2006/main">
-  <p:cSld>
-    <p:spTree>
-      <p:nvGrpSpPr>
-        <p:cNvPr id="1" name=""/>
-        <p:cNvGrpSpPr/>
-        <p:nvPr/>
-      </p:nvGrpSpPr>
-      <p:grpSpPr>
-        <a:xfrm>
-          <a:off x="0" y="0"/>
-          <a:ext cx="0" cy="0"/>
-          <a:chOff x="0" y="0"/>
-          <a:chExt cx="0" cy="0"/>
-        </a:xfrm>
-      </p:grpSpPr>
-      <p:sp>
-        <p:nvSpPr>
-          <p:cNvPr id="2" name="Title 1"/>
-          <p:cNvSpPr>
-            <a:spLocks noGrp="1"/>
-          </p:cNvSpPr>
-          <p:nvPr>
-            <p:ph type="ctrTitle"/>
-          </p:nvPr>
-        </p:nvSpPr>
-        <p:spPr>
-          <a:xfrm>
-            <a:off x="685800" y="381000"/>
-            <a:ext cx="7772400" cy="1470025"/>
-          </a:xfrm>
-        </p:spPr>
-        <p:txBody>
-          <a:bodyPr/>
-          <a:lstStyle/>
-          <a:p>
-            <a:r>
-              <a:rPr lang="en-US" dirty="0" smtClean="0"/>
-              <a:t>PEAS</a:t>
-            </a:r>
-            <a:endParaRPr lang="en-US" dirty="0"/>
-          </a:p>
-        </p:txBody>
-      </p:sp>
-      <p:sp>
-        <p:nvSpPr>
-          <p:cNvPr id="3" name="Subtitle 2"/>
-          <p:cNvSpPr>
-            <a:spLocks noGrp="1"/>
-          </p:cNvSpPr>
-          <p:nvPr>
-            <p:ph type="subTitle" idx="1"/>
-          </p:nvPr>
-        </p:nvSpPr>
-        <p:spPr>
-          <a:xfrm>
-            <a:off x="762000" y="1447800"/>
-            <a:ext cx="7543800" cy="4191000"/>
-          </a:xfrm>
-        </p:spPr>
-        <p:txBody>
-          <a:bodyPr>
-            <a:noAutofit/>
-          </a:bodyPr>
-          <a:lstStyle/>
-          <a:p>
-            <a:pPr algn="l"/>
-            <a:r>
-              <a:rPr lang="en-US" sz="2000" dirty="0" smtClean="0"/>
-              <a:t>Performance</a:t>
-            </a:r>
-          </a:p>
-          <a:p>
-            <a:pPr marL="457200" indent="-457200" algn="l">
-              <a:buFont typeface="Arial" panose="020B0604020202020204" pitchFamily="34" charset="0"/>
-              <a:buChar char="•"/>
-            </a:pPr>
-            <a:r>
-              <a:rPr lang="en-US" sz="2000" dirty="0" smtClean="0"/>
-              <a:t>Win the game</a:t>
-            </a:r>
-          </a:p>
-          <a:p>
-            <a:pPr marL="457200" indent="-457200" algn="l">
-              <a:buFont typeface="Arial" panose="020B0604020202020204" pitchFamily="34" charset="0"/>
-              <a:buChar char="•"/>
-            </a:pPr>
-            <a:r>
-              <a:rPr lang="en-US" sz="2000" dirty="0" smtClean="0"/>
-              <a:t>Too slow, infeasible time</a:t>
-            </a:r>
-          </a:p>
-          <a:p>
-            <a:pPr algn="l"/>
-            <a:r>
-              <a:rPr lang="en-US" sz="2000" dirty="0" smtClean="0"/>
-              <a:t>Environment</a:t>
-            </a:r>
-          </a:p>
-          <a:p>
-            <a:pPr marL="457200" indent="-457200" algn="l">
-              <a:buFont typeface="Arial" panose="020B0604020202020204" pitchFamily="34" charset="0"/>
-              <a:buChar char="•"/>
-            </a:pPr>
-            <a:r>
-              <a:rPr lang="en-US" sz="2000" dirty="0" smtClean="0"/>
-              <a:t>Game board 8x8 grid</a:t>
-            </a:r>
-          </a:p>
-          <a:p>
-            <a:pPr algn="l"/>
-            <a:r>
-              <a:rPr lang="en-US" sz="2000" dirty="0" smtClean="0"/>
-              <a:t>Actuator</a:t>
-            </a:r>
-          </a:p>
-          <a:p>
-            <a:pPr marL="457200" indent="-457200" algn="l">
-              <a:buFont typeface="Arial" panose="020B0604020202020204" pitchFamily="34" charset="0"/>
-              <a:buChar char="•"/>
-            </a:pPr>
-            <a:r>
-              <a:rPr lang="en-US" sz="2000" dirty="0" smtClean="0"/>
-              <a:t>Placing tiles on the board</a:t>
-            </a:r>
-            <a:endParaRPr lang="en-US" sz="2000" dirty="0" smtClean="0"/>
-          </a:p>
-          <a:p>
-            <a:pPr algn="l"/>
-            <a:r>
-              <a:rPr lang="en-US" sz="2000" dirty="0" smtClean="0"/>
-              <a:t>Sensor</a:t>
-            </a:r>
-          </a:p>
-          <a:p>
-            <a:pPr marL="457200" indent="-457200" algn="l">
-              <a:buFont typeface="Arial" panose="020B0604020202020204" pitchFamily="34" charset="0"/>
-              <a:buChar char="•"/>
-            </a:pPr>
-            <a:r>
-              <a:rPr lang="en-US" sz="2000" dirty="0" smtClean="0"/>
-              <a:t>Board stored as matrix for evaluation</a:t>
-            </a:r>
-            <a:endParaRPr lang="en-US" sz="2000" dirty="0"/>
-          </a:p>
-        </p:txBody>
-      </p:sp>
-    </p:spTree>
-    <p:extLst>
-      <p:ext uri="{BB962C8B-B14F-4D97-AF65-F5344CB8AC3E}">
-        <p14:creationId xmlns:p14="http://schemas.microsoft.com/office/powerpoint/2010/main" val="3352461406"/>
-      </p:ext>
-    </p:extLst>
-  </p:cSld>
-  <p:clrMapOvr>
-    <a:masterClrMapping/>
-  </p:clrMapOvr>
-</p:sld>
-</file>
-
-<file path=ppt/slides/slide7.xml><?xml version="1.0" encoding="utf-8"?>
-<p:sld xmlns:a="http://schemas.openxmlformats.org/drawingml/2006/main" xmlns:r="http://schemas.openxmlformats.org/officeDocument/2006/relationships" xmlns:p="http://schemas.openxmlformats.org/presentationml/2006/main">
-  <p:cSld>
-    <p:spTree>
-      <p:nvGrpSpPr>
-        <p:cNvPr id="1" name=""/>
-        <p:cNvGrpSpPr/>
-        <p:nvPr/>
-      </p:nvGrpSpPr>
-      <p:grpSpPr>
-        <a:xfrm>
-          <a:off x="0" y="0"/>
-          <a:ext cx="0" cy="0"/>
-          <a:chOff x="0" y="0"/>
-          <a:chExt cx="0" cy="0"/>
-        </a:xfrm>
-      </p:grpSpPr>
-      <p:sp>
-        <p:nvSpPr>
-          <p:cNvPr id="2" name="Title 1"/>
-          <p:cNvSpPr>
-            <a:spLocks noGrp="1"/>
-          </p:cNvSpPr>
-          <p:nvPr>
-            <p:ph type="ctrTitle"/>
-          </p:nvPr>
-        </p:nvSpPr>
-        <p:spPr>
-          <a:xfrm>
-            <a:off x="685800" y="381000"/>
-            <a:ext cx="7772400" cy="1470025"/>
-          </a:xfrm>
-        </p:spPr>
-        <p:txBody>
-          <a:bodyPr/>
-          <a:lstStyle/>
-          <a:p>
-            <a:r>
-              <a:rPr lang="en-US" dirty="0" smtClean="0"/>
-              <a:t>Describe GUI</a:t>
-            </a:r>
-            <a:endParaRPr lang="en-US" dirty="0"/>
-          </a:p>
-        </p:txBody>
-      </p:sp>
-      <p:sp>
-        <p:nvSpPr>
-          <p:cNvPr id="3" name="Subtitle 2"/>
-          <p:cNvSpPr>
-            <a:spLocks noGrp="1"/>
-          </p:cNvSpPr>
-          <p:nvPr>
-            <p:ph type="subTitle" idx="1"/>
-          </p:nvPr>
-        </p:nvSpPr>
-        <p:spPr>
-          <a:xfrm>
-            <a:off x="762000" y="1447800"/>
-            <a:ext cx="7543800" cy="4191000"/>
-          </a:xfrm>
-        </p:spPr>
-        <p:txBody>
-          <a:bodyPr/>
-          <a:lstStyle/>
-          <a:p>
-            <a:pPr algn="l"/>
-            <a:r>
-              <a:rPr lang="en-US" dirty="0" smtClean="0"/>
-              <a:t>a</a:t>
-            </a:r>
-            <a:endParaRPr lang="en-US" dirty="0"/>
-          </a:p>
-        </p:txBody>
-      </p:sp>
-    </p:spTree>
-    <p:extLst>
-      <p:ext uri="{BB962C8B-B14F-4D97-AF65-F5344CB8AC3E}">
-        <p14:creationId xmlns:p14="http://schemas.microsoft.com/office/powerpoint/2010/main" val="3352461406"/>
-      </p:ext>
-    </p:extLst>
-  </p:cSld>
-  <p:clrMapOvr>
-    <a:masterClrMapping/>
-  </p:clrMapOvr>
-</p:sld>
-</file>
-
 <file path=ppt/slides/slide8.xml><?xml version="1.0" encoding="utf-8"?>
 <p:sld xmlns:a="http://schemas.openxmlformats.org/drawingml/2006/main" xmlns:r="http://schemas.openxmlformats.org/officeDocument/2006/relationships" xmlns:p="http://schemas.openxmlformats.org/presentationml/2006/main">
   <p:cSld>
@@ -6232,7 +6729,7 @@
             </a:pPr>
             <a:r>
               <a:rPr lang="en-US" sz="2000" dirty="0" smtClean="0"/>
-              <a:t>Hold a constant for depth, and increase/decrease depth based on timing requirements</a:t>
+              <a:t>Maintain a variable called depth </a:t>
             </a:r>
           </a:p>
           <a:p>
@@ -6242,19 +6739,37 @@
             </a:pPr>
             <a:r>
               <a:rPr lang="en-US" sz="2000" dirty="0" smtClean="0"/>
-              <a:t>Alpha beta pruning to speed up searches, allows a larger depth</a:t>
-            </a:r>
-          </a:p>
-          <a:p>
-            <a:pPr algn="l"/>
-            <a:endParaRPr lang="en-US" sz="2000" dirty="0"/>
-          </a:p>
-          <a:p>
-            <a:pPr algn="l"/>
+              <a:t>and </a:t>
+            </a:r>
             <a:r>
               <a:rPr lang="en-US" sz="2000" dirty="0" smtClean="0"/>
-              <a:t>Note all tiles are valid</a:t>
-            </a:r>
+              <a:t>increase/decrease depth based on timing </a:t>
+            </a:r>
+            <a:r>
+              <a:rPr lang="en-US" sz="2000" dirty="0" smtClean="0"/>
+              <a:t>requirements</a:t>
+            </a:r>
+          </a:p>
+          <a:p>
+            <a:pPr marL="800100" lvl="1" indent="-342900" algn="l">
+              <a:buFont typeface="Arial" panose="020B0604020202020204" pitchFamily="34" charset="0"/>
+              <a:buChar char="•"/>
+            </a:pPr>
+            <a:r>
+              <a:rPr lang="en-US" sz="1600" dirty="0" smtClean="0"/>
+              <a:t>If there is extra time in the current search, then increase depth for next iteration, and run depth first search again.</a:t>
+            </a:r>
+          </a:p>
+          <a:p>
+            <a:pPr marL="800100" lvl="1" indent="-342900" algn="l">
+              <a:buFont typeface="Arial" panose="020B0604020202020204" pitchFamily="34" charset="0"/>
+              <a:buChar char="•"/>
+            </a:pPr>
+            <a:r>
+              <a:rPr lang="en-US" sz="1600" dirty="0" smtClean="0"/>
+              <a:t>If this search is taking too long, then decrease depth. The next move will use a search with a lower depth </a:t>
+            </a:r>
+            <a:endParaRPr lang="en-US" sz="1200" dirty="0" smtClean="0"/>
           </a:p>
           <a:p>
             <a:pPr marL="342900" indent="-342900" algn="l">
@@ -6262,29 +6777,55 @@
               <a:buChar char="•"/>
             </a:pPr>
             <a:r>
-              <a:rPr lang="en-US" sz="2000" dirty="0"/>
-              <a:t>Avoid branching on all 64 tiles</a:t>
-            </a:r>
-          </a:p>
-          <a:p>
-            <a:pPr marL="342900" indent="-342900" algn="l">
+              <a:rPr lang="en-US" sz="2000" dirty="0" smtClean="0"/>
+              <a:t>Alpha beta pruning to speed up </a:t>
+            </a:r>
+            <a:r>
+              <a:rPr lang="en-US" sz="2000" dirty="0" smtClean="0"/>
+              <a:t>searches</a:t>
+            </a:r>
+          </a:p>
+          <a:p>
+            <a:pPr marL="800100" lvl="1" indent="-342900" algn="l">
               <a:buFont typeface="Arial" panose="020B0604020202020204" pitchFamily="34" charset="0"/>
               <a:buChar char="•"/>
             </a:pPr>
             <a:r>
-              <a:rPr lang="en-US" sz="2000" dirty="0" smtClean="0"/>
-              <a:t>Ignore illegal moves</a:t>
-            </a:r>
-          </a:p>
-          <a:p>
-            <a:pPr marL="342900" indent="-342900" algn="l">
+              <a:rPr lang="en-US" sz="1600" dirty="0" smtClean="0"/>
+              <a:t>Ignore searching the rest of the children in a branch if this branch is bad</a:t>
+            </a:r>
+          </a:p>
+          <a:p>
+            <a:pPr marL="800100" lvl="1" indent="-342900" algn="l">
               <a:buFont typeface="Arial" panose="020B0604020202020204" pitchFamily="34" charset="0"/>
               <a:buChar char="•"/>
             </a:pPr>
             <a:r>
-              <a:rPr lang="en-US" sz="2000" dirty="0" smtClean="0"/>
-              <a:t>Restrict branching to tiles near existing tiles. A distance of 4 away (since 4 moves needed to win)</a:t>
-            </a:r>
+              <a:rPr lang="en-US" sz="1600" dirty="0" smtClean="0"/>
+              <a:t>Maintain a beta and alpha value in searching. If beta &lt;= alpha, we know the adversary will attempt a very good move. Do not bother to expand the rest</a:t>
+            </a:r>
+          </a:p>
+          <a:p>
+            <a:pPr marL="800100" lvl="1" indent="-342900" algn="l">
+              <a:buFont typeface="Arial" panose="020B0604020202020204" pitchFamily="34" charset="0"/>
+              <a:buChar char="•"/>
+            </a:pPr>
+            <a:r>
+              <a:rPr lang="en-US" sz="1600" dirty="0" smtClean="0"/>
+              <a:t>Gives algorithm more time, </a:t>
+            </a:r>
+            <a:r>
+              <a:rPr lang="en-US" sz="1600" dirty="0" smtClean="0"/>
+              <a:t>allowing for </a:t>
+            </a:r>
+            <a:r>
+              <a:rPr lang="en-US" sz="1600" dirty="0" smtClean="0"/>
+              <a:t>a larger depth</a:t>
+            </a:r>
+          </a:p>
+          <a:p>
+            <a:pPr algn="l"/>
+            <a:endParaRPr lang="en-US" sz="2000" dirty="0"/>
           </a:p>
         </p:txBody>
       </p:sp>
@@ -6340,11 +6881,7 @@
           <a:p>
             <a:r>
               <a:rPr lang="en-US" dirty="0" smtClean="0"/>
-              <a:t>Algorithm </a:t>
-            </a:r>
-            <a:r>
-              <a:rPr lang="en-US" dirty="0" smtClean="0"/>
-              <a:t>Enhancements</a:t>
+              <a:t>Pictures of Algorithm Debugging</a:t>
             </a:r>
             <a:endParaRPr lang="en-US" dirty="0"/>
           </a:p>
@@ -6367,39 +6904,15 @@
           </a:xfrm>
         </p:spPr>
         <p:txBody>
-          <a:bodyPr>
-            <a:normAutofit/>
-          </a:bodyPr>
+          <a:bodyPr/>
           <a:lstStyle/>
           <a:p>
             <a:pPr algn="l"/>
             <a:r>
-              <a:rPr lang="en-US" sz="2000" dirty="0" smtClean="0"/>
-              <a:t>Even if some tiles are valid for expansion. </a:t>
-            </a:r>
-            <a:r>
-              <a:rPr lang="en-US" sz="2000" dirty="0" smtClean="0"/>
-              <a:t>Do not bother to expand if the value is too low.</a:t>
-            </a:r>
-          </a:p>
-          <a:p>
-            <a:pPr algn="l"/>
-            <a:r>
-              <a:rPr lang="en-US" sz="2000" dirty="0" smtClean="0"/>
-              <a:t>Algorithm will look all values of available tiles and determine a threshold value. Tiles with values below the threshold will not be expanded.</a:t>
-            </a:r>
-          </a:p>
-          <a:p>
-            <a:pPr algn="l"/>
-            <a:r>
-              <a:rPr lang="en-US" sz="2000" dirty="0" smtClean="0"/>
-              <a:t>Reduce branching factor and speed up algorith</a:t>
-            </a:r>
-            <a:r>
-              <a:rPr lang="en-US" sz="2000" dirty="0" smtClean="0"/>
-              <a:t>m. This gives it more time to evaluate better branches to a larger depth</a:t>
-            </a:r>
-            <a:endParaRPr lang="en-US" sz="2000" dirty="0"/>
+              <a:rPr lang="en-US" dirty="0" smtClean="0"/>
+              <a:t>TODO, crease VISIO picture here….</a:t>
+            </a:r>
+            <a:endParaRPr lang="en-US" dirty="0"/>
           </a:p>
         </p:txBody>
       </p:sp>

</xml_diff>

<commit_message>
changes to presentation and win rate
</commit_message>
<xml_diff>
--- a/Presentation.pptx
+++ b/Presentation.pptx
@@ -606,6 +606,142 @@
 </p:notes>
 </file>
 
+<file path=ppt/notesSlides/notesSlide10.xml><?xml version="1.0" encoding="utf-8"?>
+<p:notes xmlns:a="http://schemas.openxmlformats.org/drawingml/2006/main" xmlns:r="http://schemas.openxmlformats.org/officeDocument/2006/relationships" xmlns:p="http://schemas.openxmlformats.org/presentationml/2006/main">
+  <p:cSld>
+    <p:spTree>
+      <p:nvGrpSpPr>
+        <p:cNvPr id="1" name=""/>
+        <p:cNvGrpSpPr/>
+        <p:nvPr/>
+      </p:nvGrpSpPr>
+      <p:grpSpPr>
+        <a:xfrm>
+          <a:off x="0" y="0"/>
+          <a:ext cx="0" cy="0"/>
+          <a:chOff x="0" y="0"/>
+          <a:chExt cx="0" cy="0"/>
+        </a:xfrm>
+      </p:grpSpPr>
+      <p:sp>
+        <p:nvSpPr>
+          <p:cNvPr id="2" name="Slide Image Placeholder 1"/>
+          <p:cNvSpPr>
+            <a:spLocks noGrp="1" noRot="1" noChangeAspect="1"/>
+          </p:cNvSpPr>
+          <p:nvPr>
+            <p:ph type="sldImg"/>
+          </p:nvPr>
+        </p:nvSpPr>
+        <p:spPr/>
+      </p:sp>
+      <p:sp>
+        <p:nvSpPr>
+          <p:cNvPr id="3" name="Notes Placeholder 2"/>
+          <p:cNvSpPr>
+            <a:spLocks noGrp="1"/>
+          </p:cNvSpPr>
+          <p:nvPr>
+            <p:ph type="body" idx="1"/>
+          </p:nvPr>
+        </p:nvSpPr>
+        <p:spPr/>
+        <p:txBody>
+          <a:bodyPr/>
+          <a:lstStyle/>
+          <a:p>
+            <a:r>
+              <a:rPr lang="en-US" baseline="0" dirty="0" smtClean="0"/>
+              <a:t>Making </a:t>
+            </a:r>
+            <a:r>
+              <a:rPr lang="en-US" baseline="0" dirty="0" smtClean="0"/>
+              <a:t>obvious winning moves wasn’t very good. The other player could easily block those moves. Whoever when we increase the depth of the searches, the AI would choose to rather make more tricky moves that allowed multiple winning moves. Being able to plan moves ahead has a large advantage. </a:t>
+            </a:r>
+          </a:p>
+          <a:p>
+            <a:endParaRPr lang="en-US" baseline="0" dirty="0" smtClean="0"/>
+          </a:p>
+          <a:p>
+            <a:endParaRPr lang="en-US" baseline="0" dirty="0" smtClean="0"/>
+          </a:p>
+          <a:p>
+            <a:pPr marL="0" marR="0" indent="0" algn="l" defTabSz="914400" rtl="0" eaLnBrk="1" fontAlgn="auto" latinLnBrk="0" hangingPunct="1">
+              <a:lnSpc>
+                <a:spcPct val="100000"/>
+              </a:lnSpc>
+              <a:spcBef>
+                <a:spcPts val="0"/>
+              </a:spcBef>
+              <a:spcAft>
+                <a:spcPts val="0"/>
+              </a:spcAft>
+              <a:buClrTx/>
+              <a:buSzTx/>
+              <a:buFontTx/>
+              <a:buNone/>
+              <a:tabLst/>
+              <a:defRPr/>
+            </a:pPr>
+            <a:r>
+              <a:rPr lang="en-US" sz="1200" dirty="0" smtClean="0"/>
+              <a:t>Bad utility</a:t>
+            </a:r>
+            <a:r>
+              <a:rPr lang="en-US" sz="1200" baseline="0" dirty="0" smtClean="0"/>
+              <a:t> function</a:t>
+            </a:r>
+            <a:r>
+              <a:rPr lang="en-US" sz="1200" dirty="0" smtClean="0"/>
+              <a:t> will cause deep searches to be meaningless. If the</a:t>
+            </a:r>
+            <a:r>
+              <a:rPr lang="en-US" sz="1200" baseline="0" dirty="0" smtClean="0"/>
+              <a:t> utility function is not very good, then the good and better moves will have the same values. The AI will think they will have both just as good as the other and will not make the better move. The heuristic needs to be improved to better differentiate between what’s a good move and what is better or else having deep searches will not be as effective.</a:t>
+            </a:r>
+            <a:endParaRPr lang="en-US" sz="1200" dirty="0" smtClean="0"/>
+          </a:p>
+          <a:p>
+            <a:endParaRPr lang="en-US" dirty="0"/>
+          </a:p>
+        </p:txBody>
+      </p:sp>
+      <p:sp>
+        <p:nvSpPr>
+          <p:cNvPr id="4" name="Slide Number Placeholder 3"/>
+          <p:cNvSpPr>
+            <a:spLocks noGrp="1"/>
+          </p:cNvSpPr>
+          <p:nvPr>
+            <p:ph type="sldNum" sz="quarter" idx="10"/>
+          </p:nvPr>
+        </p:nvSpPr>
+        <p:spPr/>
+        <p:txBody>
+          <a:bodyPr/>
+          <a:lstStyle/>
+          <a:p>
+            <a:fld id="{90E07049-BCFC-4BE9-BA06-3BBAAC671169}" type="slidenum">
+              <a:rPr lang="en-US" smtClean="0"/>
+              <a:t>15</a:t>
+            </a:fld>
+            <a:endParaRPr lang="en-US" dirty="0"/>
+          </a:p>
+        </p:txBody>
+      </p:sp>
+    </p:spTree>
+    <p:extLst>
+      <p:ext uri="{BB962C8B-B14F-4D97-AF65-F5344CB8AC3E}">
+        <p14:creationId xmlns:p14="http://schemas.microsoft.com/office/powerpoint/2010/main" val="4084235364"/>
+      </p:ext>
+    </p:extLst>
+  </p:cSld>
+  <p:clrMapOvr>
+    <a:masterClrMapping/>
+  </p:clrMapOvr>
+</p:notes>
+</file>
+
 <file path=ppt/notesSlides/notesSlide2.xml><?xml version="1.0" encoding="utf-8"?>
 <p:notes xmlns:a="http://schemas.openxmlformats.org/drawingml/2006/main" xmlns:r="http://schemas.openxmlformats.org/officeDocument/2006/relationships" xmlns:p="http://schemas.openxmlformats.org/presentationml/2006/main">
   <p:cSld>
@@ -967,29 +1103,6 @@
           <a:p>
             <a:endParaRPr lang="en-US" baseline="0" dirty="0" smtClean="0"/>
           </a:p>
-          <a:p>
-            <a:r>
-              <a:rPr lang="en-US" baseline="0" dirty="0" smtClean="0"/>
-              <a:t>However even this wasn’t good enough. Later in the game, there would be even more tiles on the board and more tiles are eligible to distance 4 away from </a:t>
-            </a:r>
-            <a:r>
-              <a:rPr lang="en-US" baseline="0" dirty="0" err="1" smtClean="0"/>
-              <a:t>exisiting</a:t>
-            </a:r>
-            <a:r>
-              <a:rPr lang="en-US" baseline="0" dirty="0" smtClean="0"/>
-              <a:t> tiles. </a:t>
-            </a:r>
-          </a:p>
-          <a:p>
-            <a:endParaRPr lang="en-US" baseline="0" dirty="0" smtClean="0"/>
-          </a:p>
-          <a:p>
-            <a:r>
-              <a:rPr lang="en-US" baseline="0" dirty="0" smtClean="0"/>
-              <a:t>The threshold will grow with time and reduce branching factor.</a:t>
-            </a:r>
-          </a:p>
         </p:txBody>
       </p:sp>
       <p:sp>
@@ -1505,85 +1618,7 @@
           <a:bodyPr/>
           <a:lstStyle/>
           <a:p>
-            <a:r>
-              <a:rPr lang="en-US" dirty="0" smtClean="0"/>
-              <a:t>Going first</a:t>
-            </a:r>
-            <a:r>
-              <a:rPr lang="en-US" baseline="0" dirty="0" smtClean="0"/>
-              <a:t> seems to have a huge advantage. Having the extra move advantage makes an AI one step ahead to win the game. Because of the nature of the game, it seems the player going second is more defensive than the first.  It was rare to see the AI win when going second.</a:t>
-            </a:r>
             <a:endParaRPr lang="en-US" dirty="0" smtClean="0"/>
-          </a:p>
-          <a:p>
-            <a:endParaRPr lang="en-US" dirty="0" smtClean="0"/>
-          </a:p>
-          <a:p>
-            <a:r>
-              <a:rPr lang="en-US" dirty="0" smtClean="0"/>
-              <a:t>No initial</a:t>
-            </a:r>
-            <a:r>
-              <a:rPr lang="en-US" baseline="0" dirty="0" smtClean="0"/>
-              <a:t> position is special. </a:t>
-            </a:r>
-          </a:p>
-          <a:p>
-            <a:r>
-              <a:rPr lang="en-US" baseline="0" dirty="0" smtClean="0"/>
-              <a:t>Values don’t really fluctuate when no other tiles available to affect costs</a:t>
-            </a:r>
-          </a:p>
-          <a:p>
-            <a:endParaRPr lang="en-US" baseline="0" dirty="0" smtClean="0"/>
-          </a:p>
-          <a:p>
-            <a:r>
-              <a:rPr lang="en-US" baseline="0" dirty="0" smtClean="0"/>
-              <a:t>Making obvious winning moves wasn’t very good. The other player could easily block those moves. Whoever when we increase the depth of the searches, the AI would choose to rather make more tricky moves that allowed multiple winning moves. Being able to plan moves ahead has a large advantage. </a:t>
-            </a:r>
-          </a:p>
-          <a:p>
-            <a:endParaRPr lang="en-US" baseline="0" dirty="0" smtClean="0"/>
-          </a:p>
-          <a:p>
-            <a:endParaRPr lang="en-US" baseline="0" dirty="0" smtClean="0"/>
-          </a:p>
-          <a:p>
-            <a:pPr marL="0" marR="0" indent="0" algn="l" defTabSz="914400" rtl="0" eaLnBrk="1" fontAlgn="auto" latinLnBrk="0" hangingPunct="1">
-              <a:lnSpc>
-                <a:spcPct val="100000"/>
-              </a:lnSpc>
-              <a:spcBef>
-                <a:spcPts val="0"/>
-              </a:spcBef>
-              <a:spcAft>
-                <a:spcPts val="0"/>
-              </a:spcAft>
-              <a:buClrTx/>
-              <a:buSzTx/>
-              <a:buFontTx/>
-              <a:buNone/>
-              <a:tabLst/>
-              <a:defRPr/>
-            </a:pPr>
-            <a:r>
-              <a:rPr lang="en-US" sz="1200" dirty="0" smtClean="0"/>
-              <a:t>Bad utility</a:t>
-            </a:r>
-            <a:r>
-              <a:rPr lang="en-US" sz="1200" baseline="0" dirty="0" smtClean="0"/>
-              <a:t> function</a:t>
-            </a:r>
-            <a:r>
-              <a:rPr lang="en-US" sz="1200" dirty="0" smtClean="0"/>
-              <a:t> will cause deep searches to be meaningless. If the</a:t>
-            </a:r>
-            <a:r>
-              <a:rPr lang="en-US" sz="1200" baseline="0" dirty="0" smtClean="0"/>
-              <a:t> utility function is not very good, then the good and better moves will have the same values. The AI will think they will have both just as good as the other and will not make the better move. The heuristic needs to be improved to better differentiate between what’s a good move and what is better or else having deep searches will not be as effective.</a:t>
-            </a:r>
-            <a:endParaRPr lang="en-US" sz="1200" dirty="0" smtClean="0"/>
           </a:p>
           <a:p>
             <a:endParaRPr lang="en-US" dirty="0"/>
@@ -1607,7 +1642,7 @@
           <a:p>
             <a:fld id="{90E07049-BCFC-4BE9-BA06-3BBAAC671169}" type="slidenum">
               <a:rPr lang="en-US" smtClean="0"/>
-              <a:t>15</a:t>
+              <a:t>14</a:t>
             </a:fld>
             <a:endParaRPr lang="en-US" dirty="0"/>
           </a:p>
@@ -1616,7 +1651,7 @@
     </p:spTree>
     <p:extLst>
       <p:ext uri="{BB962C8B-B14F-4D97-AF65-F5344CB8AC3E}">
-        <p14:creationId xmlns:p14="http://schemas.microsoft.com/office/powerpoint/2010/main" val="4084235364"/>
+        <p14:creationId xmlns:p14="http://schemas.microsoft.com/office/powerpoint/2010/main" val="715122884"/>
       </p:ext>
     </p:extLst>
   </p:cSld>
@@ -4783,8 +4818,23 @@
             </a:pPr>
             <a:r>
               <a:rPr lang="en-US" sz="1600" dirty="0" smtClean="0"/>
-              <a:t>Depth will increase on successive moves through</a:t>
-            </a:r>
+              <a:t>Depth will increase on successive </a:t>
+            </a:r>
+            <a:r>
+              <a:rPr lang="en-US" sz="1600" dirty="0" smtClean="0"/>
+              <a:t>moves</a:t>
+            </a:r>
+          </a:p>
+          <a:p>
+            <a:pPr marL="800100" lvl="1" indent="-342900" algn="l">
+              <a:buFont typeface="Arial" panose="020B0604020202020204" pitchFamily="34" charset="0"/>
+              <a:buChar char="•"/>
+            </a:pPr>
+            <a:r>
+              <a:rPr lang="en-US" sz="1600" dirty="0" smtClean="0"/>
+              <a:t>Let depth increase with time, instead of decrease with time</a:t>
+            </a:r>
+            <a:endParaRPr lang="en-US" sz="1600" dirty="0" smtClean="0"/>
           </a:p>
           <a:p>
             <a:pPr algn="l"/>
@@ -6674,8 +6724,13 @@
             </a:pPr>
             <a:r>
               <a:rPr lang="en-US" sz="1600" dirty="0" smtClean="0"/>
-              <a:t>Depth 0 AI will not expand moves, but just find max of tile values</a:t>
-            </a:r>
+              <a:t>Depth 0 AI will not expand moves, but just find max of tile </a:t>
+            </a:r>
+            <a:r>
+              <a:rPr lang="en-US" sz="1600" dirty="0" smtClean="0"/>
+              <a:t>values and commit to max</a:t>
+            </a:r>
+            <a:endParaRPr lang="en-US" sz="1600" dirty="0" smtClean="0"/>
           </a:p>
           <a:p>
             <a:pPr marL="800100" lvl="1" indent="-342900" algn="l">
@@ -6684,8 +6739,13 @@
             </a:pPr>
             <a:r>
               <a:rPr lang="en-US" sz="1600" dirty="0" smtClean="0"/>
-              <a:t>Algorithm sometimes lost if the first move was bad. We gave algorithm a low starting depth value and it would occasionally pick a bad first move</a:t>
-            </a:r>
+              <a:t>Algorithm sometimes lost if </a:t>
+            </a:r>
+            <a:r>
+              <a:rPr lang="en-US" sz="1600" dirty="0" smtClean="0"/>
+              <a:t>made obvious winning chains. The depth 0 AI was smart enough to block the AI and become in the lead</a:t>
+            </a:r>
+            <a:endParaRPr lang="en-US" sz="1600" dirty="0" smtClean="0"/>
           </a:p>
           <a:p>
             <a:pPr algn="l"/>
@@ -6728,8 +6788,13 @@
             </a:pPr>
             <a:r>
               <a:rPr lang="en-US" sz="2000" dirty="0" smtClean="0"/>
-              <a:t>Compared to players, the algorithm would win sometimes</a:t>
-            </a:r>
+              <a:t>Compared to players, the algorithm would win </a:t>
+            </a:r>
+            <a:r>
+              <a:rPr lang="en-US" sz="2000" dirty="0" smtClean="0"/>
+              <a:t>sometimes, not often</a:t>
+            </a:r>
+            <a:endParaRPr lang="en-US" sz="2000" dirty="0" smtClean="0"/>
           </a:p>
           <a:p>
             <a:pPr marL="342900" indent="-342900" algn="l">
@@ -6768,8 +6833,13 @@
             </a:pPr>
             <a:r>
               <a:rPr lang="en-US" sz="1600" dirty="0" smtClean="0"/>
-              <a:t>It can be easy to beat if the player went first</a:t>
-            </a:r>
+              <a:t>It can be easy to beat </a:t>
+            </a:r>
+            <a:r>
+              <a:rPr lang="en-US" sz="1600" dirty="0" smtClean="0"/>
+              <a:t>by players who plan ahead</a:t>
+            </a:r>
+            <a:endParaRPr lang="en-US" sz="1600" dirty="0" smtClean="0"/>
           </a:p>
           <a:p>
             <a:pPr marL="800100" lvl="1" indent="-342900" algn="l">
@@ -7056,8 +7126,21 @@
             </a:pPr>
             <a:r>
               <a:rPr lang="en-US" sz="1600" dirty="0" smtClean="0"/>
-              <a:t>Trying to win looks better than trying to block</a:t>
-            </a:r>
+              <a:t>Trying to win </a:t>
+            </a:r>
+            <a:r>
+              <a:rPr lang="en-US" sz="1600" dirty="0" smtClean="0"/>
+              <a:t>appears better </a:t>
+            </a:r>
+            <a:r>
+              <a:rPr lang="en-US" sz="1600" dirty="0" smtClean="0"/>
+              <a:t>than trying to </a:t>
+            </a:r>
+            <a:r>
+              <a:rPr lang="en-US" sz="1600" dirty="0" smtClean="0"/>
+              <a:t>block, didn’t block often</a:t>
+            </a:r>
+            <a:endParaRPr lang="en-US" sz="1600" dirty="0" smtClean="0"/>
           </a:p>
           <a:p>
             <a:pPr marL="342900" indent="-342900" algn="l">
@@ -7171,21 +7254,18 @@
         </p:spPr>
         <p:txBody>
           <a:bodyPr>
-            <a:normAutofit lnSpcReduction="10000"/>
+            <a:normAutofit fontScale="92500" lnSpcReduction="10000"/>
           </a:bodyPr>
           <a:lstStyle/>
           <a:p>
             <a:pPr algn="l"/>
             <a:r>
               <a:rPr lang="en-US" sz="2000" dirty="0" smtClean="0"/>
-              <a:t>Going first has a great advantage</a:t>
-            </a:r>
-          </a:p>
-          <a:p>
-            <a:pPr algn="l"/>
+              <a:t>Early </a:t>
+            </a:r>
             <a:r>
               <a:rPr lang="en-US" sz="2000" dirty="0" smtClean="0"/>
-              <a:t>Early in the game, large depth has little deciding factor</a:t>
+              <a:t>in the game, large depth has little deciding factor</a:t>
             </a:r>
           </a:p>
           <a:p>
@@ -7222,8 +7302,23 @@
             </a:pPr>
             <a:r>
               <a:rPr lang="en-US" sz="2000" dirty="0" smtClean="0"/>
-              <a:t>The best moves are not as obvious</a:t>
-            </a:r>
+              <a:t>The best moves are not as </a:t>
+            </a:r>
+            <a:r>
+              <a:rPr lang="en-US" sz="2000" dirty="0" smtClean="0"/>
+              <a:t>obvious</a:t>
+            </a:r>
+          </a:p>
+          <a:p>
+            <a:pPr marL="342900" indent="-342900" algn="l">
+              <a:buFont typeface="Arial" panose="020B0604020202020204" pitchFamily="34" charset="0"/>
+              <a:buChar char="•"/>
+            </a:pPr>
+            <a:r>
+              <a:rPr lang="en-US" sz="2000" dirty="0" smtClean="0"/>
+              <a:t>Allowing depth to fluctuate and potentially increase will help the AI make smarter moves when needed</a:t>
+            </a:r>
+            <a:endParaRPr lang="en-US" sz="2000" dirty="0" smtClean="0"/>
           </a:p>
           <a:p>
             <a:pPr algn="l"/>
@@ -7353,19 +7448,7 @@
             <a:pPr algn="l"/>
             <a:r>
               <a:rPr lang="en-US" dirty="0" smtClean="0"/>
-              <a:t>The object of our Four-In-A-Row is to get four in a row. The first player displays as O, and the second player displays X. Then player1 and player2 alternatively place their chesses until one player has 4 in a row or the board is </a:t>
-            </a:r>
-            <a:r>
-              <a:rPr lang="en-US" dirty="0" smtClean="0"/>
-              <a:t>entirely filled </a:t>
-            </a:r>
-            <a:r>
-              <a:rPr lang="en-US" dirty="0" smtClean="0"/>
-              <a:t>with </a:t>
-            </a:r>
-            <a:r>
-              <a:rPr lang="en-US" dirty="0" smtClean="0"/>
-              <a:t>pieces. </a:t>
+              <a:t>The object of our Four-In-A-Row is to get four in a row. The first player displays as O, and the second player displays X. Then player1 and player2 alternatively place their chesses until one player has 4 in a row or the board is entirely filled with pieces. </a:t>
             </a:r>
             <a:endParaRPr lang="en-US" dirty="0"/>
           </a:p>
@@ -9942,7 +10025,7 @@
         </p:spPr>
         <p:txBody>
           <a:bodyPr>
-            <a:normAutofit fontScale="92500" lnSpcReduction="20000"/>
+            <a:normAutofit/>
           </a:bodyPr>
           <a:lstStyle/>
           <a:p>
@@ -9990,14 +10073,38 @@
             </a:pPr>
             <a:r>
               <a:rPr lang="en-US" sz="2000" dirty="0"/>
-              <a:t>Restrict branching to tiles near existing tiles. A distance of 4 away (since 4 moves needed to win)</a:t>
+              <a:t>Restrict branching to tiles near existing tiles. A distance of </a:t>
+            </a:r>
+            <a:r>
+              <a:rPr lang="en-US" sz="2000" dirty="0" smtClean="0"/>
+              <a:t>3 </a:t>
+            </a:r>
+            <a:r>
+              <a:rPr lang="en-US" sz="2000" dirty="0"/>
+              <a:t>away </a:t>
+            </a:r>
+            <a:r>
+              <a:rPr lang="en-US" sz="2000" dirty="0" smtClean="0"/>
+              <a:t>from existing tiles(since </a:t>
+            </a:r>
+            <a:r>
+              <a:rPr lang="en-US" sz="2000" dirty="0"/>
+              <a:t>4 moves needed to win)</a:t>
             </a:r>
           </a:p>
           <a:p>
             <a:pPr algn="l"/>
             <a:r>
               <a:rPr lang="en-US" sz="2000" dirty="0" smtClean="0"/>
-              <a:t>Even if some tiles are valid for expansion. Do not bother to expand if the tile’s value is too low.</a:t>
+              <a:t>By </a:t>
+            </a:r>
+            <a:r>
+              <a:rPr lang="en-US" sz="2000" dirty="0" smtClean="0"/>
+              <a:t>reducing branching factor, we are able to speed up algorithm. This gives it more time to evaluate better branches to a larger </a:t>
+            </a:r>
+            <a:r>
+              <a:rPr lang="en-US" sz="2000" dirty="0" smtClean="0"/>
+              <a:t>depth</a:t>
             </a:r>
           </a:p>
           <a:p>
@@ -10007,24 +10114,7 @@
             </a:pPr>
             <a:r>
               <a:rPr lang="en-US" sz="2000" dirty="0" smtClean="0"/>
-              <a:t>Algorithm will look all values of available tiles and determine a threshold value. </a:t>
-            </a:r>
-          </a:p>
-          <a:p>
-            <a:pPr marL="342900" indent="-342900" algn="l">
-              <a:buFont typeface="Arial" panose="020B0604020202020204" pitchFamily="34" charset="0"/>
-              <a:buChar char="•"/>
-            </a:pPr>
-            <a:r>
-              <a:rPr lang="en-US" sz="2000" dirty="0" smtClean="0"/>
-              <a:t>Tiles with values below the threshold will not be expanded.</a:t>
-            </a:r>
-          </a:p>
-          <a:p>
-            <a:pPr algn="l"/>
-            <a:r>
-              <a:rPr lang="en-US" sz="2000" dirty="0" smtClean="0"/>
-              <a:t>By reducing branching factor, we are able to speed up algorithm. This gives it more time to evaluate better branches to a larger depth</a:t>
+              <a:t>However, time still grew exponentially as more moves are placed on board and more tiles become qualified for being distance 3 away</a:t>
             </a:r>
             <a:endParaRPr lang="en-US" sz="2000" dirty="0"/>
           </a:p>

</xml_diff>